<commit_message>
Improve mobile whiteboard App and implement timeout
</commit_message>
<xml_diff>
--- a/scene/images/materials.pptx
+++ b/scene/images/materials.pptx
@@ -104,6 +104,11 @@
       </a:defRPr>
     </a:lvl9pPr>
   </p:defaultTextStyle>
+  <p:extLst>
+    <p:ext uri="{EFAFB233-063F-42B5-8137-9DF3F51BA10A}">
+      <p15:sldGuideLst xmlns:p15="http://schemas.microsoft.com/office/powerpoint/2012/main"/>
+    </p:ext>
+  </p:extLst>
 </p:presentation>
 </file>
 
@@ -256,7 +261,7 @@
           <a:p>
             <a:fld id="{0E85E9C7-35FF-457B-9536-8325BD40AD2C}" type="datetimeFigureOut">
               <a:rPr lang="en-GB" smtClean="0"/>
-              <a:t>07/12/2020</a:t>
+              <a:t>17/12/2020</a:t>
             </a:fld>
             <a:endParaRPr lang="en-GB"/>
           </a:p>
@@ -456,7 +461,7 @@
           <a:p>
             <a:fld id="{0E85E9C7-35FF-457B-9536-8325BD40AD2C}" type="datetimeFigureOut">
               <a:rPr lang="en-GB" smtClean="0"/>
-              <a:t>07/12/2020</a:t>
+              <a:t>17/12/2020</a:t>
             </a:fld>
             <a:endParaRPr lang="en-GB"/>
           </a:p>
@@ -666,7 +671,7 @@
           <a:p>
             <a:fld id="{0E85E9C7-35FF-457B-9536-8325BD40AD2C}" type="datetimeFigureOut">
               <a:rPr lang="en-GB" smtClean="0"/>
-              <a:t>07/12/2020</a:t>
+              <a:t>17/12/2020</a:t>
             </a:fld>
             <a:endParaRPr lang="en-GB"/>
           </a:p>
@@ -866,7 +871,7 @@
           <a:p>
             <a:fld id="{0E85E9C7-35FF-457B-9536-8325BD40AD2C}" type="datetimeFigureOut">
               <a:rPr lang="en-GB" smtClean="0"/>
-              <a:t>07/12/2020</a:t>
+              <a:t>17/12/2020</a:t>
             </a:fld>
             <a:endParaRPr lang="en-GB"/>
           </a:p>
@@ -1142,7 +1147,7 @@
           <a:p>
             <a:fld id="{0E85E9C7-35FF-457B-9536-8325BD40AD2C}" type="datetimeFigureOut">
               <a:rPr lang="en-GB" smtClean="0"/>
-              <a:t>07/12/2020</a:t>
+              <a:t>17/12/2020</a:t>
             </a:fld>
             <a:endParaRPr lang="en-GB"/>
           </a:p>
@@ -1410,7 +1415,7 @@
           <a:p>
             <a:fld id="{0E85E9C7-35FF-457B-9536-8325BD40AD2C}" type="datetimeFigureOut">
               <a:rPr lang="en-GB" smtClean="0"/>
-              <a:t>07/12/2020</a:t>
+              <a:t>17/12/2020</a:t>
             </a:fld>
             <a:endParaRPr lang="en-GB"/>
           </a:p>
@@ -1825,7 +1830,7 @@
           <a:p>
             <a:fld id="{0E85E9C7-35FF-457B-9536-8325BD40AD2C}" type="datetimeFigureOut">
               <a:rPr lang="en-GB" smtClean="0"/>
-              <a:t>07/12/2020</a:t>
+              <a:t>17/12/2020</a:t>
             </a:fld>
             <a:endParaRPr lang="en-GB"/>
           </a:p>
@@ -1967,7 +1972,7 @@
           <a:p>
             <a:fld id="{0E85E9C7-35FF-457B-9536-8325BD40AD2C}" type="datetimeFigureOut">
               <a:rPr lang="en-GB" smtClean="0"/>
-              <a:t>07/12/2020</a:t>
+              <a:t>17/12/2020</a:t>
             </a:fld>
             <a:endParaRPr lang="en-GB"/>
           </a:p>
@@ -2080,7 +2085,7 @@
           <a:p>
             <a:fld id="{0E85E9C7-35FF-457B-9536-8325BD40AD2C}" type="datetimeFigureOut">
               <a:rPr lang="en-GB" smtClean="0"/>
-              <a:t>07/12/2020</a:t>
+              <a:t>17/12/2020</a:t>
             </a:fld>
             <a:endParaRPr lang="en-GB"/>
           </a:p>
@@ -2393,7 +2398,7 @@
           <a:p>
             <a:fld id="{0E85E9C7-35FF-457B-9536-8325BD40AD2C}" type="datetimeFigureOut">
               <a:rPr lang="en-GB" smtClean="0"/>
-              <a:t>07/12/2020</a:t>
+              <a:t>17/12/2020</a:t>
             </a:fld>
             <a:endParaRPr lang="en-GB"/>
           </a:p>
@@ -2682,7 +2687,7 @@
           <a:p>
             <a:fld id="{0E85E9C7-35FF-457B-9536-8325BD40AD2C}" type="datetimeFigureOut">
               <a:rPr lang="en-GB" smtClean="0"/>
-              <a:t>07/12/2020</a:t>
+              <a:t>17/12/2020</a:t>
             </a:fld>
             <a:endParaRPr lang="en-GB"/>
           </a:p>
@@ -2925,7 +2930,7 @@
           <a:p>
             <a:fld id="{0E85E9C7-35FF-457B-9536-8325BD40AD2C}" type="datetimeFigureOut">
               <a:rPr lang="en-GB" smtClean="0"/>
-              <a:t>07/12/2020</a:t>
+              <a:t>17/12/2020</a:t>
             </a:fld>
             <a:endParaRPr lang="en-GB"/>
           </a:p>
@@ -3344,6 +3349,57 @@
       </p:grpSpPr>
       <p:sp>
         <p:nvSpPr>
+          <p:cNvPr id="21" name="Rectangle 20">
+            <a:extLst>
+              <a:ext uri="{FF2B5EF4-FFF2-40B4-BE49-F238E27FC236}">
+                <a16:creationId xmlns:a16="http://schemas.microsoft.com/office/drawing/2014/main" id="{3D857C51-CE39-41B3-BB58-E559B24BD108}"/>
+              </a:ext>
+            </a:extLst>
+          </p:cNvPr>
+          <p:cNvSpPr/>
+          <p:nvPr/>
+        </p:nvSpPr>
+        <p:spPr>
+          <a:xfrm>
+            <a:off x="622992" y="812800"/>
+            <a:ext cx="2583180" cy="1524000"/>
+          </a:xfrm>
+          <a:prstGeom prst="rect">
+            <a:avLst/>
+          </a:prstGeom>
+          <a:solidFill>
+            <a:schemeClr val="bg2">
+              <a:lumMod val="50000"/>
+            </a:schemeClr>
+          </a:solidFill>
+        </p:spPr>
+        <p:style>
+          <a:lnRef idx="2">
+            <a:schemeClr val="accent1">
+              <a:shade val="50000"/>
+            </a:schemeClr>
+          </a:lnRef>
+          <a:fillRef idx="1">
+            <a:schemeClr val="accent1"/>
+          </a:fillRef>
+          <a:effectRef idx="0">
+            <a:schemeClr val="accent1"/>
+          </a:effectRef>
+          <a:fontRef idx="minor">
+            <a:schemeClr val="lt1"/>
+          </a:fontRef>
+        </p:style>
+        <p:txBody>
+          <a:bodyPr rtlCol="0" anchor="ctr"/>
+          <a:lstStyle/>
+          <a:p>
+            <a:pPr algn="ctr"/>
+            <a:endParaRPr lang="en-GB"/>
+          </a:p>
+        </p:txBody>
+      </p:sp>
+      <p:sp>
+        <p:nvSpPr>
           <p:cNvPr id="4" name="TextBox 3">
             <a:extLst>
               <a:ext uri="{FF2B5EF4-FFF2-40B4-BE49-F238E27FC236}">
@@ -3636,6 +3692,602 @@
           </a:p>
         </p:txBody>
       </p:sp>
+      <p:sp>
+        <p:nvSpPr>
+          <p:cNvPr id="2" name="Rectangle: Rounded Corners 1">
+            <a:extLst>
+              <a:ext uri="{FF2B5EF4-FFF2-40B4-BE49-F238E27FC236}">
+                <a16:creationId xmlns:a16="http://schemas.microsoft.com/office/drawing/2014/main" id="{E4136A4B-04BB-4CF4-90C4-B6636D4DD26E}"/>
+              </a:ext>
+            </a:extLst>
+          </p:cNvPr>
+          <p:cNvSpPr/>
+          <p:nvPr/>
+        </p:nvSpPr>
+        <p:spPr>
+          <a:xfrm>
+            <a:off x="1366787" y="2713833"/>
+            <a:ext cx="1530417" cy="2782192"/>
+          </a:xfrm>
+          <a:prstGeom prst="roundRect">
+            <a:avLst/>
+          </a:prstGeom>
+        </p:spPr>
+        <p:style>
+          <a:lnRef idx="1">
+            <a:schemeClr val="dk1"/>
+          </a:lnRef>
+          <a:fillRef idx="2">
+            <a:schemeClr val="dk1"/>
+          </a:fillRef>
+          <a:effectRef idx="1">
+            <a:schemeClr val="dk1"/>
+          </a:effectRef>
+          <a:fontRef idx="minor">
+            <a:schemeClr val="dk1"/>
+          </a:fontRef>
+        </p:style>
+        <p:txBody>
+          <a:bodyPr rtlCol="0" anchor="ctr"/>
+          <a:lstStyle/>
+          <a:p>
+            <a:pPr algn="ctr"/>
+            <a:endParaRPr lang="en-GB"/>
+          </a:p>
+        </p:txBody>
+      </p:sp>
+      <p:sp>
+        <p:nvSpPr>
+          <p:cNvPr id="13" name="Rectangle: Rounded Corners 12">
+            <a:extLst>
+              <a:ext uri="{FF2B5EF4-FFF2-40B4-BE49-F238E27FC236}">
+                <a16:creationId xmlns:a16="http://schemas.microsoft.com/office/drawing/2014/main" id="{D08051F4-8945-4589-B48F-8389BC1AAC83}"/>
+              </a:ext>
+            </a:extLst>
+          </p:cNvPr>
+          <p:cNvSpPr/>
+          <p:nvPr/>
+        </p:nvSpPr>
+        <p:spPr>
+          <a:xfrm>
+            <a:off x="1408703" y="2888904"/>
+            <a:ext cx="1446585" cy="2432051"/>
+          </a:xfrm>
+          <a:prstGeom prst="roundRect">
+            <a:avLst>
+              <a:gd name="adj" fmla="val 5254"/>
+            </a:avLst>
+          </a:prstGeom>
+          <a:solidFill>
+            <a:schemeClr val="bg2">
+              <a:lumMod val="90000"/>
+            </a:schemeClr>
+          </a:solidFill>
+          <a:ln w="6350">
+            <a:solidFill>
+              <a:schemeClr val="tx1"/>
+            </a:solidFill>
+          </a:ln>
+        </p:spPr>
+        <p:style>
+          <a:lnRef idx="1">
+            <a:schemeClr val="dk1"/>
+          </a:lnRef>
+          <a:fillRef idx="2">
+            <a:schemeClr val="dk1"/>
+          </a:fillRef>
+          <a:effectRef idx="1">
+            <a:schemeClr val="dk1"/>
+          </a:effectRef>
+          <a:fontRef idx="minor">
+            <a:schemeClr val="dk1"/>
+          </a:fontRef>
+        </p:style>
+        <p:txBody>
+          <a:bodyPr rtlCol="0" anchor="ctr"/>
+          <a:lstStyle/>
+          <a:p>
+            <a:pPr algn="ctr"/>
+            <a:endParaRPr lang="en-GB"/>
+          </a:p>
+        </p:txBody>
+      </p:sp>
+      <p:sp>
+        <p:nvSpPr>
+          <p:cNvPr id="11" name="Rectangle 10">
+            <a:extLst>
+              <a:ext uri="{FF2B5EF4-FFF2-40B4-BE49-F238E27FC236}">
+                <a16:creationId xmlns:a16="http://schemas.microsoft.com/office/drawing/2014/main" id="{92D14F79-FBD0-426E-B310-2B00A662E50A}"/>
+              </a:ext>
+            </a:extLst>
+          </p:cNvPr>
+          <p:cNvSpPr/>
+          <p:nvPr/>
+        </p:nvSpPr>
+        <p:spPr>
+          <a:xfrm>
+            <a:off x="1423987" y="3194124"/>
+            <a:ext cx="1423733" cy="1821611"/>
+          </a:xfrm>
+          <a:prstGeom prst="rect">
+            <a:avLst/>
+          </a:prstGeom>
+        </p:spPr>
+        <p:style>
+          <a:lnRef idx="2">
+            <a:schemeClr val="dk1"/>
+          </a:lnRef>
+          <a:fillRef idx="1">
+            <a:schemeClr val="lt1"/>
+          </a:fillRef>
+          <a:effectRef idx="0">
+            <a:schemeClr val="dk1"/>
+          </a:effectRef>
+          <a:fontRef idx="minor">
+            <a:schemeClr val="dk1"/>
+          </a:fontRef>
+        </p:style>
+        <p:txBody>
+          <a:bodyPr rtlCol="0" anchor="ctr"/>
+          <a:lstStyle/>
+          <a:p>
+            <a:pPr algn="ctr"/>
+            <a:endParaRPr lang="en-GB"/>
+          </a:p>
+        </p:txBody>
+      </p:sp>
+      <p:sp>
+        <p:nvSpPr>
+          <p:cNvPr id="12" name="Freeform: Shape 11">
+            <a:extLst>
+              <a:ext uri="{FF2B5EF4-FFF2-40B4-BE49-F238E27FC236}">
+                <a16:creationId xmlns:a16="http://schemas.microsoft.com/office/drawing/2014/main" id="{A48E97FB-46F8-4755-B144-1D3A967CE36D}"/>
+              </a:ext>
+            </a:extLst>
+          </p:cNvPr>
+          <p:cNvSpPr/>
+          <p:nvPr/>
+        </p:nvSpPr>
+        <p:spPr>
+          <a:xfrm>
+            <a:off x="1563412" y="3772735"/>
+            <a:ext cx="991507" cy="1133778"/>
+          </a:xfrm>
+          <a:custGeom>
+            <a:avLst/>
+            <a:gdLst>
+              <a:gd name="connsiteX0" fmla="*/ 342390 w 991507"/>
+              <a:gd name="connsiteY0" fmla="*/ 318002 h 1133778"/>
+              <a:gd name="connsiteX1" fmla="*/ 987283 w 991507"/>
+              <a:gd name="connsiteY1" fmla="*/ 674137 h 1133778"/>
+              <a:gd name="connsiteX2" fmla="*/ 63257 w 991507"/>
+              <a:gd name="connsiteY2" fmla="*/ 962894 h 1133778"/>
+              <a:gd name="connsiteX3" fmla="*/ 101759 w 991507"/>
+              <a:gd name="connsiteY3" fmla="*/ 368 h 1133778"/>
+              <a:gd name="connsiteX4" fmla="*/ 265388 w 991507"/>
+              <a:gd name="connsiteY4" fmla="*/ 1088023 h 1133778"/>
+              <a:gd name="connsiteX5" fmla="*/ 448268 w 991507"/>
+              <a:gd name="connsiteY5" fmla="*/ 914768 h 1133778"/>
+              <a:gd name="connsiteX6" fmla="*/ 361641 w 991507"/>
+              <a:gd name="connsiteY6" fmla="*/ 770389 h 1133778"/>
+            </a:gdLst>
+            <a:ahLst/>
+            <a:cxnLst>
+              <a:cxn ang="0">
+                <a:pos x="connsiteX0" y="connsiteY0"/>
+              </a:cxn>
+              <a:cxn ang="0">
+                <a:pos x="connsiteX1" y="connsiteY1"/>
+              </a:cxn>
+              <a:cxn ang="0">
+                <a:pos x="connsiteX2" y="connsiteY2"/>
+              </a:cxn>
+              <a:cxn ang="0">
+                <a:pos x="connsiteX3" y="connsiteY3"/>
+              </a:cxn>
+              <a:cxn ang="0">
+                <a:pos x="connsiteX4" y="connsiteY4"/>
+              </a:cxn>
+              <a:cxn ang="0">
+                <a:pos x="connsiteX5" y="connsiteY5"/>
+              </a:cxn>
+              <a:cxn ang="0">
+                <a:pos x="connsiteX6" y="connsiteY6"/>
+              </a:cxn>
+            </a:cxnLst>
+            <a:rect l="l" t="t" r="r" b="b"/>
+            <a:pathLst>
+              <a:path w="991507" h="1133778">
+                <a:moveTo>
+                  <a:pt x="342390" y="318002"/>
+                </a:moveTo>
+                <a:cubicBezTo>
+                  <a:pt x="688097" y="442328"/>
+                  <a:pt x="1033805" y="566655"/>
+                  <a:pt x="987283" y="674137"/>
+                </a:cubicBezTo>
+                <a:cubicBezTo>
+                  <a:pt x="940761" y="781619"/>
+                  <a:pt x="210844" y="1075189"/>
+                  <a:pt x="63257" y="962894"/>
+                </a:cubicBezTo>
+                <a:cubicBezTo>
+                  <a:pt x="-84330" y="850599"/>
+                  <a:pt x="68070" y="-20487"/>
+                  <a:pt x="101759" y="368"/>
+                </a:cubicBezTo>
+                <a:cubicBezTo>
+                  <a:pt x="135447" y="21223"/>
+                  <a:pt x="207636" y="935623"/>
+                  <a:pt x="265388" y="1088023"/>
+                </a:cubicBezTo>
+                <a:cubicBezTo>
+                  <a:pt x="323139" y="1240423"/>
+                  <a:pt x="432226" y="967707"/>
+                  <a:pt x="448268" y="914768"/>
+                </a:cubicBezTo>
+                <a:cubicBezTo>
+                  <a:pt x="464310" y="861829"/>
+                  <a:pt x="404955" y="815307"/>
+                  <a:pt x="361641" y="770389"/>
+                </a:cubicBezTo>
+              </a:path>
+            </a:pathLst>
+          </a:custGeom>
+          <a:noFill/>
+          <a:ln w="19050">
+            <a:solidFill>
+              <a:schemeClr val="tx1"/>
+            </a:solidFill>
+          </a:ln>
+        </p:spPr>
+        <p:style>
+          <a:lnRef idx="2">
+            <a:schemeClr val="accent1">
+              <a:shade val="50000"/>
+            </a:schemeClr>
+          </a:lnRef>
+          <a:fillRef idx="1">
+            <a:schemeClr val="accent1"/>
+          </a:fillRef>
+          <a:effectRef idx="0">
+            <a:schemeClr val="accent1"/>
+          </a:effectRef>
+          <a:fontRef idx="minor">
+            <a:schemeClr val="lt1"/>
+          </a:fontRef>
+        </p:style>
+        <p:txBody>
+          <a:bodyPr rtlCol="0" anchor="ctr"/>
+          <a:lstStyle/>
+          <a:p>
+            <a:pPr algn="ctr"/>
+            <a:endParaRPr lang="en-GB"/>
+          </a:p>
+        </p:txBody>
+      </p:sp>
+      <p:pic>
+        <p:nvPicPr>
+          <p:cNvPr id="16" name="Picture 15">
+            <a:extLst>
+              <a:ext uri="{FF2B5EF4-FFF2-40B4-BE49-F238E27FC236}">
+                <a16:creationId xmlns:a16="http://schemas.microsoft.com/office/drawing/2014/main" id="{623AC378-01CD-4CC7-B464-9F484FD0FAB4}"/>
+              </a:ext>
+            </a:extLst>
+          </p:cNvPr>
+          <p:cNvPicPr>
+            <a:picLocks noChangeAspect="1"/>
+          </p:cNvPicPr>
+          <p:nvPr/>
+        </p:nvPicPr>
+        <p:blipFill>
+          <a:blip r:embed="rId2">
+            <a:clrChange>
+              <a:clrFrom>
+                <a:srgbClr val="FFFFFF"/>
+              </a:clrFrom>
+              <a:clrTo>
+                <a:srgbClr val="FFFFFF">
+                  <a:alpha val="0"/>
+                </a:srgbClr>
+              </a:clrTo>
+            </a:clrChange>
+            <a:extLst>
+              <a:ext uri="{28A0092B-C50C-407E-A947-70E740481C1C}">
+                <a14:useLocalDpi xmlns:a14="http://schemas.microsoft.com/office/drawing/2010/main" val="0"/>
+              </a:ext>
+            </a:extLst>
+          </a:blip>
+          <a:stretch>
+            <a:fillRect/>
+          </a:stretch>
+        </p:blipFill>
+        <p:spPr>
+          <a:xfrm>
+            <a:off x="2373436" y="3425092"/>
+            <a:ext cx="2143125" cy="2143125"/>
+          </a:xfrm>
+          <a:prstGeom prst="rect">
+            <a:avLst/>
+          </a:prstGeom>
+        </p:spPr>
+      </p:pic>
+      <p:pic>
+        <p:nvPicPr>
+          <p:cNvPr id="10" name="Picture 9">
+            <a:extLst>
+              <a:ext uri="{FF2B5EF4-FFF2-40B4-BE49-F238E27FC236}">
+                <a16:creationId xmlns:a16="http://schemas.microsoft.com/office/drawing/2014/main" id="{44121D40-773A-4E40-AA76-89E0E4C16958}"/>
+              </a:ext>
+            </a:extLst>
+          </p:cNvPr>
+          <p:cNvPicPr>
+            <a:picLocks noChangeAspect="1"/>
+          </p:cNvPicPr>
+          <p:nvPr/>
+        </p:nvPicPr>
+        <p:blipFill>
+          <a:blip r:embed="rId3">
+            <a:extLst>
+              <a:ext uri="{28A0092B-C50C-407E-A947-70E740481C1C}">
+                <a14:useLocalDpi xmlns:a14="http://schemas.microsoft.com/office/drawing/2010/main" val="0"/>
+              </a:ext>
+              <a:ext uri="{837473B0-CC2E-450A-ABE3-18F120FF3D39}">
+                <a1611:picAttrSrcUrl xmlns:a1611="http://schemas.microsoft.com/office/drawing/2016/11/main" r:id="rId4"/>
+              </a:ext>
+            </a:extLst>
+          </a:blip>
+          <a:stretch>
+            <a:fillRect/>
+          </a:stretch>
+        </p:blipFill>
+        <p:spPr>
+          <a:xfrm>
+            <a:off x="1914582" y="2867176"/>
+            <a:ext cx="1237237" cy="1237753"/>
+          </a:xfrm>
+          <a:prstGeom prst="rect">
+            <a:avLst/>
+          </a:prstGeom>
+        </p:spPr>
+      </p:pic>
+      <p:sp>
+        <p:nvSpPr>
+          <p:cNvPr id="22" name="Rectangle 21">
+            <a:extLst>
+              <a:ext uri="{FF2B5EF4-FFF2-40B4-BE49-F238E27FC236}">
+                <a16:creationId xmlns:a16="http://schemas.microsoft.com/office/drawing/2014/main" id="{F165D8F9-AE7A-4A88-AA0D-81B9D9BFC971}"/>
+              </a:ext>
+            </a:extLst>
+          </p:cNvPr>
+          <p:cNvSpPr/>
+          <p:nvPr/>
+        </p:nvSpPr>
+        <p:spPr>
+          <a:xfrm>
+            <a:off x="1438085" y="991504"/>
+            <a:ext cx="1626131" cy="45719"/>
+          </a:xfrm>
+          <a:prstGeom prst="rect">
+            <a:avLst/>
+          </a:prstGeom>
+          <a:effectLst>
+            <a:glow rad="457200">
+              <a:schemeClr val="bg2">
+                <a:alpha val="40000"/>
+              </a:schemeClr>
+            </a:glow>
+          </a:effectLst>
+        </p:spPr>
+        <p:style>
+          <a:lnRef idx="1">
+            <a:schemeClr val="dk1"/>
+          </a:lnRef>
+          <a:fillRef idx="3">
+            <a:schemeClr val="dk1"/>
+          </a:fillRef>
+          <a:effectRef idx="2">
+            <a:schemeClr val="dk1"/>
+          </a:effectRef>
+          <a:fontRef idx="minor">
+            <a:schemeClr val="lt1"/>
+          </a:fontRef>
+        </p:style>
+        <p:txBody>
+          <a:bodyPr rtlCol="0" anchor="ctr"/>
+          <a:lstStyle/>
+          <a:p>
+            <a:pPr algn="ctr"/>
+            <a:endParaRPr lang="en-GB"/>
+          </a:p>
+        </p:txBody>
+      </p:sp>
+      <p:sp>
+        <p:nvSpPr>
+          <p:cNvPr id="23" name="Rectangle 22">
+            <a:extLst>
+              <a:ext uri="{FF2B5EF4-FFF2-40B4-BE49-F238E27FC236}">
+                <a16:creationId xmlns:a16="http://schemas.microsoft.com/office/drawing/2014/main" id="{BB4F614A-6238-466F-8000-14543638C443}"/>
+              </a:ext>
+            </a:extLst>
+          </p:cNvPr>
+          <p:cNvSpPr/>
+          <p:nvPr/>
+        </p:nvSpPr>
+        <p:spPr>
+          <a:xfrm>
+            <a:off x="1464016" y="1406858"/>
+            <a:ext cx="1626131" cy="130187"/>
+          </a:xfrm>
+          <a:prstGeom prst="rect">
+            <a:avLst/>
+          </a:prstGeom>
+          <a:effectLst>
+            <a:glow rad="304800">
+              <a:schemeClr val="bg2">
+                <a:alpha val="40000"/>
+              </a:schemeClr>
+            </a:glow>
+          </a:effectLst>
+        </p:spPr>
+        <p:style>
+          <a:lnRef idx="1">
+            <a:schemeClr val="dk1"/>
+          </a:lnRef>
+          <a:fillRef idx="3">
+            <a:schemeClr val="dk1"/>
+          </a:fillRef>
+          <a:effectRef idx="2">
+            <a:schemeClr val="dk1"/>
+          </a:effectRef>
+          <a:fontRef idx="minor">
+            <a:schemeClr val="lt1"/>
+          </a:fontRef>
+        </p:style>
+        <p:txBody>
+          <a:bodyPr rtlCol="0" anchor="ctr"/>
+          <a:lstStyle/>
+          <a:p>
+            <a:pPr algn="ctr"/>
+            <a:endParaRPr lang="en-GB"/>
+          </a:p>
+        </p:txBody>
+      </p:sp>
+      <p:sp>
+        <p:nvSpPr>
+          <p:cNvPr id="24" name="Rectangle 23">
+            <a:extLst>
+              <a:ext uri="{FF2B5EF4-FFF2-40B4-BE49-F238E27FC236}">
+                <a16:creationId xmlns:a16="http://schemas.microsoft.com/office/drawing/2014/main" id="{57EADAAF-AA33-492F-87CD-6966C912A528}"/>
+              </a:ext>
+            </a:extLst>
+          </p:cNvPr>
+          <p:cNvSpPr/>
+          <p:nvPr/>
+        </p:nvSpPr>
+        <p:spPr>
+          <a:xfrm>
+            <a:off x="1479550" y="1900671"/>
+            <a:ext cx="1626131" cy="248802"/>
+          </a:xfrm>
+          <a:prstGeom prst="rect">
+            <a:avLst/>
+          </a:prstGeom>
+          <a:effectLst>
+            <a:glow rad="152400">
+              <a:schemeClr val="bg2">
+                <a:alpha val="40000"/>
+              </a:schemeClr>
+            </a:glow>
+          </a:effectLst>
+        </p:spPr>
+        <p:style>
+          <a:lnRef idx="1">
+            <a:schemeClr val="dk1"/>
+          </a:lnRef>
+          <a:fillRef idx="3">
+            <a:schemeClr val="dk1"/>
+          </a:fillRef>
+          <a:effectRef idx="2">
+            <a:schemeClr val="dk1"/>
+          </a:effectRef>
+          <a:fontRef idx="minor">
+            <a:schemeClr val="lt1"/>
+          </a:fontRef>
+        </p:style>
+        <p:txBody>
+          <a:bodyPr rtlCol="0" anchor="ctr"/>
+          <a:lstStyle/>
+          <a:p>
+            <a:pPr algn="ctr"/>
+            <a:endParaRPr lang="en-GB"/>
+          </a:p>
+        </p:txBody>
+      </p:sp>
+      <p:pic>
+        <p:nvPicPr>
+          <p:cNvPr id="26" name="Picture 25">
+            <a:extLst>
+              <a:ext uri="{FF2B5EF4-FFF2-40B4-BE49-F238E27FC236}">
+                <a16:creationId xmlns:a16="http://schemas.microsoft.com/office/drawing/2014/main" id="{3A202CD6-48A6-4D90-AE9A-0B1F3EAB6B34}"/>
+              </a:ext>
+            </a:extLst>
+          </p:cNvPr>
+          <p:cNvPicPr>
+            <a:picLocks noChangeAspect="1"/>
+          </p:cNvPicPr>
+          <p:nvPr/>
+        </p:nvPicPr>
+        <p:blipFill>
+          <a:blip r:embed="rId5">
+            <a:extLst>
+              <a:ext uri="{28A0092B-C50C-407E-A947-70E740481C1C}">
+                <a14:useLocalDpi xmlns:a14="http://schemas.microsoft.com/office/drawing/2010/main" val="0"/>
+              </a:ext>
+            </a:extLst>
+          </a:blip>
+          <a:stretch>
+            <a:fillRect/>
+          </a:stretch>
+        </p:blipFill>
+        <p:spPr>
+          <a:xfrm>
+            <a:off x="9582452" y="930037"/>
+            <a:ext cx="909766" cy="909766"/>
+          </a:xfrm>
+          <a:prstGeom prst="rect">
+            <a:avLst/>
+          </a:prstGeom>
+          <a:gradFill flip="none" rotWithShape="1">
+            <a:gsLst>
+              <a:gs pos="0">
+                <a:schemeClr val="accent3">
+                  <a:lumMod val="31000"/>
+                  <a:lumOff val="69000"/>
+                </a:schemeClr>
+              </a:gs>
+              <a:gs pos="48000">
+                <a:schemeClr val="accent3">
+                  <a:lumMod val="68000"/>
+                  <a:lumOff val="32000"/>
+                </a:schemeClr>
+              </a:gs>
+              <a:gs pos="100000">
+                <a:schemeClr val="accent3">
+                  <a:lumMod val="60000"/>
+                  <a:lumOff val="40000"/>
+                </a:schemeClr>
+              </a:gs>
+            </a:gsLst>
+            <a:lin ang="16200000" scaled="1"/>
+            <a:tileRect/>
+          </a:gradFill>
+          <a:ln>
+            <a:noFill/>
+          </a:ln>
+          <a:scene3d>
+            <a:camera prst="orthographicFront"/>
+            <a:lightRig rig="threePt" dir="t"/>
+          </a:scene3d>
+          <a:sp3d>
+            <a:bevelT/>
+          </a:sp3d>
+        </p:spPr>
+        <p:style>
+          <a:lnRef idx="0">
+            <a:scrgbClr r="0" g="0" b="0"/>
+          </a:lnRef>
+          <a:fillRef idx="0">
+            <a:scrgbClr r="0" g="0" b="0"/>
+          </a:fillRef>
+          <a:effectRef idx="0">
+            <a:scrgbClr r="0" g="0" b="0"/>
+          </a:effectRef>
+          <a:fontRef idx="minor">
+            <a:schemeClr val="lt1"/>
+          </a:fontRef>
+        </p:style>
+      </p:pic>
     </p:spTree>
     <p:extLst>
       <p:ext uri="{BB962C8B-B14F-4D97-AF65-F5344CB8AC3E}">

</xml_diff>